<commit_message>
Supervisórios CLP Recomendações .... - 08Mai2025
</commit_message>
<xml_diff>
--- a/01 Classes/Aula7 - CLP - Redes Industriais PROFIBUS.pptx
+++ b/01 Classes/Aula7 - CLP - Redes Industriais PROFIBUS.pptx
@@ -8569,13 +8569,10 @@
             <a:pPr marL="0" indent="0" algn="just">
               <a:buNone/>
             </a:pPr>
-            <a:r>
-              <a:rPr lang="pt-BR" sz="2200" b="1" dirty="0">
-                <a:latin typeface="Times New Roman" panose="02020603050405020304" pitchFamily="18" charset="0"/>
-                <a:cs typeface="Times New Roman" panose="02020603050405020304" pitchFamily="18" charset="0"/>
-              </a:rPr>
-              <a:t>.</a:t>
-            </a:r>
+            <a:endParaRPr lang="pt-BR" sz="2200" b="1" dirty="0">
+              <a:latin typeface="Times New Roman" panose="02020603050405020304" pitchFamily="18" charset="0"/>
+              <a:cs typeface="Times New Roman" panose="02020603050405020304" pitchFamily="18" charset="0"/>
+            </a:endParaRPr>
           </a:p>
           <a:p>
             <a:pPr marL="0" indent="0" algn="just">
@@ -8590,10 +8587,10 @@
       </p:sp>
       <p:pic>
         <p:nvPicPr>
-          <p:cNvPr id="3" name="Imagem 2" descr="Interface gráfica do usuário&#10;&#10;O conteúdo gerado por IA pode estar incorreto.">
+          <p:cNvPr id="4" name="Imagem 3" descr="Interface gráfica do usuário&#10;&#10;O conteúdo gerado por IA pode estar incorreto.">
             <a:extLst>
               <a:ext uri="{FF2B5EF4-FFF2-40B4-BE49-F238E27FC236}">
-                <a16:creationId xmlns:a16="http://schemas.microsoft.com/office/drawing/2014/main" id="{697F15D4-5773-C7D0-5047-74D83F11D479}"/>
+                <a16:creationId xmlns:a16="http://schemas.microsoft.com/office/drawing/2014/main" id="{06B1594F-71C3-5E47-5C4E-1E955FF7414F}"/>
               </a:ext>
             </a:extLst>
           </p:cNvPr>
@@ -8603,15 +8600,21 @@
           <p:nvPr/>
         </p:nvPicPr>
         <p:blipFill>
-          <a:blip r:embed="rId3"/>
+          <a:blip r:embed="rId3" cstate="print">
+            <a:extLst>
+              <a:ext uri="{28A0092B-C50C-407E-A947-70E740481C1C}">
+                <a14:useLocalDpi xmlns:a14="http://schemas.microsoft.com/office/drawing/2010/main" val="0"/>
+              </a:ext>
+            </a:extLst>
+          </a:blip>
           <a:stretch>
             <a:fillRect/>
           </a:stretch>
         </p:blipFill>
         <p:spPr>
           <a:xfrm>
-            <a:off x="942974" y="991513"/>
-            <a:ext cx="6076390" cy="4050927"/>
+            <a:off x="1001869" y="943370"/>
+            <a:ext cx="5991225" cy="3994150"/>
           </a:xfrm>
           <a:prstGeom prst="rect">
             <a:avLst/>

</xml_diff>